<commit_message>
Add audio for our presentation
</commit_message>
<xml_diff>
--- a/Documentation and Presentation/Historya.pptx
+++ b/Documentation and Presentation/Historya.pptx
@@ -28,17 +28,25 @@
       <p:boldItalic r:id="rId14"/>
     </p:embeddedFont>
     <p:embeddedFont>
-      <p:font typeface="Libre Baskerville" panose="02000000000000000000" pitchFamily="2" charset="0"/>
+      <p:font typeface="Libre Baskerville" panose="020B0604020202020204" charset="0"/>
       <p:regular r:id="rId15"/>
       <p:bold r:id="rId16"/>
       <p:italic r:id="rId17"/>
     </p:embeddedFont>
     <p:embeddedFont>
+      <p:font typeface="Merriweather" panose="00000500000000000000" pitchFamily="2" charset="0"/>
+      <p:regular r:id="rId18"/>
+    </p:embeddedFont>
+    <p:embeddedFont>
       <p:font typeface="Roboto" panose="02000000000000000000" pitchFamily="2" charset="0"/>
-      <p:regular r:id="rId18"/>
-      <p:bold r:id="rId19"/>
-      <p:italic r:id="rId20"/>
-      <p:boldItalic r:id="rId21"/>
+      <p:regular r:id="rId19"/>
+      <p:bold r:id="rId20"/>
+      <p:italic r:id="rId21"/>
+      <p:boldItalic r:id="rId22"/>
+    </p:embeddedFont>
+    <p:embeddedFont>
+      <p:font typeface="Roboto Condensed Light" panose="02000000000000000000" pitchFamily="2" charset="0"/>
+      <p:regular r:id="rId23"/>
     </p:embeddedFont>
   </p:embeddedFontLst>
   <p:defaultTextStyle>
@@ -47420,11 +47428,136 @@
           </a:p>
         </p:txBody>
       </p:sp>
+      <p:pic>
+        <p:nvPicPr>
+          <p:cNvPr id="3" name="Слайд 1">
+            <a:hlinkClick r:id="" action="ppaction://media"/>
+            <a:extLst>
+              <a:ext uri="{FF2B5EF4-FFF2-40B4-BE49-F238E27FC236}">
+                <a16:creationId xmlns:a16="http://schemas.microsoft.com/office/drawing/2014/main" id="{E9BC6B6F-27C7-4514-9D9D-0665297D8EFC}"/>
+              </a:ext>
+            </a:extLst>
+          </p:cNvPr>
+          <p:cNvPicPr>
+            <a:picLocks noChangeAspect="1"/>
+          </p:cNvPicPr>
+          <p:nvPr>
+            <a:audioFile r:link="rId2"/>
+            <p:extLst>
+              <p:ext uri="{DAA4B4D4-6D71-4841-9C94-3DE7FCFB9230}">
+                <p14:media xmlns:p14="http://schemas.microsoft.com/office/powerpoint/2010/main" r:embed="rId1"/>
+              </p:ext>
+            </p:extLst>
+          </p:nvPr>
+        </p:nvPicPr>
+        <p:blipFill>
+          <a:blip r:embed="rId5"/>
+          <a:stretch>
+            <a:fillRect/>
+          </a:stretch>
+        </p:blipFill>
+        <p:spPr>
+          <a:xfrm>
+            <a:off x="9336087" y="4633068"/>
+            <a:ext cx="487363" cy="487362"/>
+          </a:xfrm>
+          <a:prstGeom prst="rect">
+            <a:avLst/>
+          </a:prstGeom>
+        </p:spPr>
+      </p:pic>
     </p:spTree>
   </p:cSld>
   <p:clrMapOvr>
     <a:masterClrMapping/>
   </p:clrMapOvr>
+  <p:timing>
+    <p:tnLst>
+      <p:par>
+        <p:cTn id="1" dur="indefinite" restart="never" nodeType="tmRoot">
+          <p:childTnLst>
+            <p:seq concurrent="1" nextAc="seek">
+              <p:cTn id="2" dur="indefinite" nodeType="mainSeq">
+                <p:childTnLst>
+                  <p:par>
+                    <p:cTn id="3" fill="hold">
+                      <p:stCondLst>
+                        <p:cond delay="indefinite"/>
+                        <p:cond evt="onBegin" delay="0">
+                          <p:tn val="2"/>
+                        </p:cond>
+                      </p:stCondLst>
+                      <p:childTnLst>
+                        <p:par>
+                          <p:cTn id="4" fill="hold">
+                            <p:stCondLst>
+                              <p:cond delay="0"/>
+                            </p:stCondLst>
+                            <p:childTnLst>
+                              <p:par>
+                                <p:cTn id="5" presetID="1" presetClass="mediacall" presetSubtype="0" fill="hold" nodeType="afterEffect">
+                                  <p:stCondLst>
+                                    <p:cond delay="0"/>
+                                  </p:stCondLst>
+                                  <p:childTnLst>
+                                    <p:cmd type="call" cmd="playFrom(0.0)">
+                                      <p:cBhvr>
+                                        <p:cTn id="6" dur="6528" fill="hold"/>
+                                        <p:tgtEl>
+                                          <p:spTgt spid="3"/>
+                                        </p:tgtEl>
+                                      </p:cBhvr>
+                                    </p:cmd>
+                                  </p:childTnLst>
+                                </p:cTn>
+                              </p:par>
+                            </p:childTnLst>
+                          </p:cTn>
+                        </p:par>
+                      </p:childTnLst>
+                    </p:cTn>
+                  </p:par>
+                </p:childTnLst>
+              </p:cTn>
+              <p:prevCondLst>
+                <p:cond evt="onPrev" delay="0">
+                  <p:tgtEl>
+                    <p:sldTgt/>
+                  </p:tgtEl>
+                </p:cond>
+              </p:prevCondLst>
+              <p:nextCondLst>
+                <p:cond evt="onNext" delay="0">
+                  <p:tgtEl>
+                    <p:sldTgt/>
+                  </p:tgtEl>
+                </p:cond>
+              </p:nextCondLst>
+            </p:seq>
+            <p:audio>
+              <p:cMediaNode vol="80000">
+                <p:cTn id="7" fill="hold" display="0">
+                  <p:stCondLst>
+                    <p:cond delay="indefinite"/>
+                  </p:stCondLst>
+                  <p:endCondLst>
+                    <p:cond evt="onStopAudio" delay="0">
+                      <p:tgtEl>
+                        <p:sldTgt/>
+                      </p:tgtEl>
+                    </p:cond>
+                  </p:endCondLst>
+                </p:cTn>
+                <p:tgtEl>
+                  <p:spTgt spid="3"/>
+                </p:tgtEl>
+              </p:cMediaNode>
+            </p:audio>
+          </p:childTnLst>
+        </p:cTn>
+      </p:par>
+    </p:tnLst>
+  </p:timing>
 </p:sld>
 </file>
 
@@ -47757,7 +47890,7 @@
           <p:nvPr/>
         </p:nvPicPr>
         <p:blipFill rotWithShape="1">
-          <a:blip r:embed="rId3"/>
+          <a:blip r:embed="rId5"/>
           <a:srcRect t="28141"/>
           <a:stretch/>
         </p:blipFill>
@@ -47786,7 +47919,7 @@
           <p:nvPr/>
         </p:nvPicPr>
         <p:blipFill rotWithShape="1">
-          <a:blip r:embed="rId4"/>
+          <a:blip r:embed="rId6"/>
           <a:srcRect l="10774" r="9791"/>
           <a:stretch/>
         </p:blipFill>
@@ -47815,7 +47948,7 @@
           <p:nvPr/>
         </p:nvPicPr>
         <p:blipFill>
-          <a:blip r:embed="rId5"/>
+          <a:blip r:embed="rId7"/>
           <a:stretch>
             <a:fillRect/>
           </a:stretch>
@@ -47845,7 +47978,7 @@
           <p:nvPr/>
         </p:nvPicPr>
         <p:blipFill>
-          <a:blip r:embed="rId6"/>
+          <a:blip r:embed="rId8"/>
           <a:stretch>
             <a:fillRect/>
           </a:stretch>
@@ -47860,11 +47993,133 @@
           </a:prstGeom>
         </p:spPr>
       </p:pic>
+      <p:pic>
+        <p:nvPicPr>
+          <p:cNvPr id="4" name="Слайд 2">
+            <a:hlinkClick r:id="" action="ppaction://media"/>
+            <a:extLst>
+              <a:ext uri="{FF2B5EF4-FFF2-40B4-BE49-F238E27FC236}">
+                <a16:creationId xmlns:a16="http://schemas.microsoft.com/office/drawing/2014/main" id="{26F6BB00-C0E1-405A-AB2E-F6C92BB5E748}"/>
+              </a:ext>
+            </a:extLst>
+          </p:cNvPr>
+          <p:cNvPicPr>
+            <a:picLocks noChangeAspect="1"/>
+          </p:cNvPicPr>
+          <p:nvPr>
+            <a:audioFile r:link="rId2"/>
+            <p:extLst>
+              <p:ext uri="{DAA4B4D4-6D71-4841-9C94-3DE7FCFB9230}">
+                <p14:media xmlns:p14="http://schemas.microsoft.com/office/powerpoint/2010/main" r:embed="rId1"/>
+              </p:ext>
+            </p:extLst>
+          </p:nvPr>
+        </p:nvPicPr>
+        <p:blipFill>
+          <a:blip r:embed="rId9"/>
+          <a:stretch>
+            <a:fillRect/>
+          </a:stretch>
+        </p:blipFill>
+        <p:spPr>
+          <a:xfrm>
+            <a:off x="9457531" y="4656137"/>
+            <a:ext cx="487363" cy="487363"/>
+          </a:xfrm>
+          <a:prstGeom prst="rect">
+            <a:avLst/>
+          </a:prstGeom>
+        </p:spPr>
+      </p:pic>
     </p:spTree>
   </p:cSld>
   <p:clrMapOvr>
     <a:masterClrMapping/>
   </p:clrMapOvr>
+  <p:timing>
+    <p:tnLst>
+      <p:par>
+        <p:cTn id="1" dur="indefinite" restart="never" nodeType="tmRoot">
+          <p:childTnLst>
+            <p:seq concurrent="1" nextAc="seek">
+              <p:cTn id="2" dur="indefinite" nodeType="mainSeq">
+                <p:childTnLst>
+                  <p:par>
+                    <p:cTn id="3" fill="hold">
+                      <p:stCondLst>
+                        <p:cond delay="indefinite"/>
+                      </p:stCondLst>
+                      <p:childTnLst>
+                        <p:par>
+                          <p:cTn id="4" fill="hold">
+                            <p:stCondLst>
+                              <p:cond delay="0"/>
+                            </p:stCondLst>
+                            <p:childTnLst>
+                              <p:par>
+                                <p:cTn id="5" presetID="1" presetClass="mediacall" presetSubtype="0" fill="hold" nodeType="clickEffect">
+                                  <p:stCondLst>
+                                    <p:cond delay="0"/>
+                                  </p:stCondLst>
+                                  <p:childTnLst>
+                                    <p:cmd type="call" cmd="playFrom(0.0)">
+                                      <p:cBhvr>
+                                        <p:cTn id="6" dur="12672" fill="hold"/>
+                                        <p:tgtEl>
+                                          <p:spTgt spid="4"/>
+                                        </p:tgtEl>
+                                      </p:cBhvr>
+                                    </p:cmd>
+                                  </p:childTnLst>
+                                </p:cTn>
+                              </p:par>
+                            </p:childTnLst>
+                          </p:cTn>
+                        </p:par>
+                      </p:childTnLst>
+                    </p:cTn>
+                  </p:par>
+                </p:childTnLst>
+              </p:cTn>
+              <p:prevCondLst>
+                <p:cond evt="onPrev" delay="0">
+                  <p:tgtEl>
+                    <p:sldTgt/>
+                  </p:tgtEl>
+                </p:cond>
+              </p:prevCondLst>
+              <p:nextCondLst>
+                <p:cond evt="onNext" delay="0">
+                  <p:tgtEl>
+                    <p:sldTgt/>
+                  </p:tgtEl>
+                </p:cond>
+              </p:nextCondLst>
+            </p:seq>
+            <p:audio>
+              <p:cMediaNode vol="80000">
+                <p:cTn id="7" fill="hold" display="0">
+                  <p:stCondLst>
+                    <p:cond delay="indefinite"/>
+                  </p:stCondLst>
+                  <p:endCondLst>
+                    <p:cond evt="onStopAudio" delay="0">
+                      <p:tgtEl>
+                        <p:sldTgt/>
+                      </p:tgtEl>
+                    </p:cond>
+                  </p:endCondLst>
+                </p:cTn>
+                <p:tgtEl>
+                  <p:spTgt spid="4"/>
+                </p:tgtEl>
+              </p:cMediaNode>
+            </p:audio>
+          </p:childTnLst>
+        </p:cTn>
+      </p:par>
+    </p:tnLst>
+  </p:timing>
 </p:sld>
 </file>
 
@@ -47933,7 +48188,7 @@
           <p:nvPr/>
         </p:nvPicPr>
         <p:blipFill>
-          <a:blip r:embed="rId2"/>
+          <a:blip r:embed="rId4"/>
           <a:stretch>
             <a:fillRect/>
           </a:stretch>
@@ -47963,7 +48218,7 @@
           <p:nvPr/>
         </p:nvPicPr>
         <p:blipFill>
-          <a:blip r:embed="rId3"/>
+          <a:blip r:embed="rId5"/>
           <a:stretch>
             <a:fillRect/>
           </a:stretch>
@@ -47993,7 +48248,7 @@
           <p:nvPr/>
         </p:nvPicPr>
         <p:blipFill>
-          <a:blip r:embed="rId4"/>
+          <a:blip r:embed="rId6"/>
           <a:stretch>
             <a:fillRect/>
           </a:stretch>
@@ -48023,7 +48278,7 @@
           <p:nvPr/>
         </p:nvPicPr>
         <p:blipFill>
-          <a:blip r:embed="rId5"/>
+          <a:blip r:embed="rId7"/>
           <a:stretch>
             <a:fillRect/>
           </a:stretch>
@@ -48053,7 +48308,7 @@
           <p:nvPr/>
         </p:nvPicPr>
         <p:blipFill>
-          <a:blip r:embed="rId6">
+          <a:blip r:embed="rId8">
             <a:extLst>
               <a:ext uri="{28A0092B-C50C-407E-A947-70E740481C1C}">
                 <a14:useLocalDpi xmlns:a14="http://schemas.microsoft.com/office/drawing/2010/main" val="0"/>
@@ -48100,7 +48355,7 @@
           <p:nvPr/>
         </p:nvPicPr>
         <p:blipFill>
-          <a:blip r:embed="rId7">
+          <a:blip r:embed="rId9">
             <a:extLst>
               <a:ext uri="{28A0092B-C50C-407E-A947-70E740481C1C}">
                 <a14:useLocalDpi xmlns:a14="http://schemas.microsoft.com/office/drawing/2010/main" val="0"/>
@@ -48132,6 +48387,44 @@
           </a:extLst>
         </p:spPr>
       </p:pic>
+      <p:pic>
+        <p:nvPicPr>
+          <p:cNvPr id="3" name="Слайд 3">
+            <a:hlinkClick r:id="" action="ppaction://media"/>
+            <a:extLst>
+              <a:ext uri="{FF2B5EF4-FFF2-40B4-BE49-F238E27FC236}">
+                <a16:creationId xmlns:a16="http://schemas.microsoft.com/office/drawing/2014/main" id="{B90CCF2E-7007-41B1-AB23-97BA1382C4F5}"/>
+              </a:ext>
+            </a:extLst>
+          </p:cNvPr>
+          <p:cNvPicPr>
+            <a:picLocks noChangeAspect="1"/>
+          </p:cNvPicPr>
+          <p:nvPr>
+            <a:audioFile r:link="rId2"/>
+            <p:extLst>
+              <p:ext uri="{DAA4B4D4-6D71-4841-9C94-3DE7FCFB9230}">
+                <p14:media xmlns:p14="http://schemas.microsoft.com/office/powerpoint/2010/main" r:embed="rId1"/>
+              </p:ext>
+            </p:extLst>
+          </p:nvPr>
+        </p:nvPicPr>
+        <p:blipFill>
+          <a:blip r:embed="rId10"/>
+          <a:stretch>
+            <a:fillRect/>
+          </a:stretch>
+        </p:blipFill>
+        <p:spPr>
+          <a:xfrm>
+            <a:off x="9442451" y="4564469"/>
+            <a:ext cx="487362" cy="487363"/>
+          </a:xfrm>
+          <a:prstGeom prst="rect">
+            <a:avLst/>
+          </a:prstGeom>
+        </p:spPr>
+      </p:pic>
     </p:spTree>
     <p:extLst>
       <p:ext uri="{BB962C8B-B14F-4D97-AF65-F5344CB8AC3E}">
@@ -48142,6 +48435,93 @@
   <p:clrMapOvr>
     <a:masterClrMapping/>
   </p:clrMapOvr>
+  <p:timing>
+    <p:tnLst>
+      <p:par>
+        <p:cTn id="1" dur="indefinite" restart="never" nodeType="tmRoot">
+          <p:childTnLst>
+            <p:seq concurrent="1" nextAc="seek">
+              <p:cTn id="2" dur="indefinite" nodeType="mainSeq">
+                <p:childTnLst>
+                  <p:par>
+                    <p:cTn id="3" fill="hold">
+                      <p:stCondLst>
+                        <p:cond delay="indefinite"/>
+                        <p:cond evt="onBegin" delay="0">
+                          <p:tn val="2"/>
+                        </p:cond>
+                      </p:stCondLst>
+                      <p:childTnLst>
+                        <p:par>
+                          <p:cTn id="4" fill="hold">
+                            <p:stCondLst>
+                              <p:cond delay="0"/>
+                            </p:stCondLst>
+                            <p:childTnLst>
+                              <p:par>
+                                <p:cTn id="5" presetID="1" presetClass="mediacall" presetSubtype="0" fill="hold" nodeType="afterEffect">
+                                  <p:stCondLst>
+                                    <p:cond delay="0"/>
+                                  </p:stCondLst>
+                                  <p:childTnLst>
+                                    <p:cmd type="call" cmd="playFrom(0.0)">
+                                      <p:cBhvr>
+                                        <p:cTn id="6" dur="12117" fill="hold"/>
+                                        <p:tgtEl>
+                                          <p:spTgt spid="3"/>
+                                        </p:tgtEl>
+                                      </p:cBhvr>
+                                    </p:cmd>
+                                  </p:childTnLst>
+                                </p:cTn>
+                              </p:par>
+                            </p:childTnLst>
+                          </p:cTn>
+                        </p:par>
+                      </p:childTnLst>
+                    </p:cTn>
+                  </p:par>
+                </p:childTnLst>
+              </p:cTn>
+              <p:prevCondLst>
+                <p:cond evt="onPrev" delay="0">
+                  <p:tgtEl>
+                    <p:sldTgt/>
+                  </p:tgtEl>
+                </p:cond>
+              </p:prevCondLst>
+              <p:nextCondLst>
+                <p:cond evt="onNext" delay="0">
+                  <p:tgtEl>
+                    <p:sldTgt/>
+                  </p:tgtEl>
+                </p:cond>
+              </p:nextCondLst>
+            </p:seq>
+            <p:audio>
+              <p:cMediaNode vol="80000">
+                <p:cTn id="7" fill="hold" display="0">
+                  <p:stCondLst>
+                    <p:cond delay="indefinite"/>
+                  </p:stCondLst>
+                  <p:endCondLst>
+                    <p:cond evt="onStopAudio" delay="0">
+                      <p:tgtEl>
+                        <p:sldTgt/>
+                      </p:tgtEl>
+                    </p:cond>
+                  </p:endCondLst>
+                </p:cTn>
+                <p:tgtEl>
+                  <p:spTgt spid="3"/>
+                </p:tgtEl>
+              </p:cMediaNode>
+            </p:audio>
+          </p:childTnLst>
+        </p:cTn>
+      </p:par>
+    </p:tnLst>
+  </p:timing>
 </p:sld>
 </file>
 
@@ -48338,7 +48718,7 @@
           <p:nvPr/>
         </p:nvPicPr>
         <p:blipFill>
-          <a:blip r:embed="rId2"/>
+          <a:blip r:embed="rId4"/>
           <a:stretch>
             <a:fillRect/>
           </a:stretch>
@@ -48368,7 +48748,7 @@
           <p:nvPr/>
         </p:nvPicPr>
         <p:blipFill>
-          <a:blip r:embed="rId3"/>
+          <a:blip r:embed="rId5"/>
           <a:stretch>
             <a:fillRect/>
           </a:stretch>
@@ -48398,7 +48778,7 @@
           <p:nvPr/>
         </p:nvPicPr>
         <p:blipFill>
-          <a:blip r:embed="rId4"/>
+          <a:blip r:embed="rId6"/>
           <a:stretch>
             <a:fillRect/>
           </a:stretch>
@@ -48407,6 +48787,44 @@
           <a:xfrm>
             <a:off x="4066054" y="363650"/>
             <a:ext cx="4071097" cy="1794021"/>
+          </a:xfrm>
+          <a:prstGeom prst="rect">
+            <a:avLst/>
+          </a:prstGeom>
+        </p:spPr>
+      </p:pic>
+      <p:pic>
+        <p:nvPicPr>
+          <p:cNvPr id="3" name="Audio 2">
+            <a:hlinkClick r:id="" action="ppaction://media"/>
+            <a:extLst>
+              <a:ext uri="{FF2B5EF4-FFF2-40B4-BE49-F238E27FC236}">
+                <a16:creationId xmlns:a16="http://schemas.microsoft.com/office/drawing/2014/main" id="{55482969-9371-40E1-AEEC-6E2FBB9DBDB7}"/>
+              </a:ext>
+            </a:extLst>
+          </p:cNvPr>
+          <p:cNvPicPr>
+            <a:picLocks noChangeAspect="1"/>
+          </p:cNvPicPr>
+          <p:nvPr>
+            <a:audioFile r:link="rId2"/>
+            <p:extLst>
+              <p:ext uri="{DAA4B4D4-6D71-4841-9C94-3DE7FCFB9230}">
+                <p14:media xmlns:p14="http://schemas.microsoft.com/office/powerpoint/2010/main" r:embed="rId1"/>
+              </p:ext>
+            </p:extLst>
+          </p:nvPr>
+        </p:nvPicPr>
+        <p:blipFill>
+          <a:blip r:embed="rId7"/>
+          <a:stretch>
+            <a:fillRect/>
+          </a:stretch>
+        </p:blipFill>
+        <p:spPr>
+          <a:xfrm>
+            <a:off x="8504238" y="4503738"/>
+            <a:ext cx="487362" cy="487362"/>
           </a:xfrm>
           <a:prstGeom prst="rect">
             <a:avLst/>
@@ -48423,6 +48841,101 @@
   <p:clrMapOvr>
     <a:masterClrMapping/>
   </p:clrMapOvr>
+  <mc:AlternateContent xmlns:mc="http://schemas.openxmlformats.org/markup-compatibility/2006">
+    <mc:Choice xmlns:p14="http://schemas.microsoft.com/office/powerpoint/2010/main" Requires="p14">
+      <p:transition spd="slow" p14:dur="2000" advTm="30915"/>
+    </mc:Choice>
+    <mc:Fallback>
+      <p:transition spd="slow" advTm="30915"/>
+    </mc:Fallback>
+  </mc:AlternateContent>
+  <p:timing>
+    <p:tnLst>
+      <p:par>
+        <p:cTn id="1" dur="indefinite" restart="never" nodeType="tmRoot">
+          <p:childTnLst>
+            <p:seq concurrent="1" nextAc="seek">
+              <p:cTn id="2" dur="indefinite" nodeType="mainSeq">
+                <p:childTnLst>
+                  <p:par>
+                    <p:cTn id="3" fill="hold">
+                      <p:stCondLst>
+                        <p:cond delay="indefinite"/>
+                        <p:cond evt="onBegin" delay="0">
+                          <p:tn val="2"/>
+                        </p:cond>
+                      </p:stCondLst>
+                      <p:childTnLst>
+                        <p:par>
+                          <p:cTn id="4" fill="hold">
+                            <p:stCondLst>
+                              <p:cond delay="0"/>
+                            </p:stCondLst>
+                            <p:childTnLst>
+                              <p:par>
+                                <p:cTn id="5" presetID="1" presetClass="mediacall" presetSubtype="0" fill="hold" nodeType="afterEffect">
+                                  <p:stCondLst>
+                                    <p:cond delay="0"/>
+                                  </p:stCondLst>
+                                  <p:childTnLst>
+                                    <p:cmd type="call" cmd="playFrom(0.0)">
+                                      <p:cBhvr>
+                                        <p:cTn id="6" dur="1" fill="hold"/>
+                                        <p:tgtEl>
+                                          <p:spTgt spid="3"/>
+                                        </p:tgtEl>
+                                      </p:cBhvr>
+                                    </p:cmd>
+                                  </p:childTnLst>
+                                </p:cTn>
+                              </p:par>
+                            </p:childTnLst>
+                          </p:cTn>
+                        </p:par>
+                      </p:childTnLst>
+                    </p:cTn>
+                  </p:par>
+                </p:childTnLst>
+              </p:cTn>
+              <p:prevCondLst>
+                <p:cond evt="onPrev" delay="0">
+                  <p:tgtEl>
+                    <p:sldTgt/>
+                  </p:tgtEl>
+                </p:cond>
+              </p:prevCondLst>
+              <p:nextCondLst>
+                <p:cond evt="onNext" delay="0">
+                  <p:tgtEl>
+                    <p:sldTgt/>
+                  </p:tgtEl>
+                </p:cond>
+              </p:nextCondLst>
+            </p:seq>
+            <p:audio isNarration="1">
+              <p:cMediaNode vol="80000" showWhenStopped="0">
+                <p:cTn id="7" fill="hold" display="0">
+                  <p:stCondLst>
+                    <p:cond delay="indefinite"/>
+                  </p:stCondLst>
+                  <p:endCondLst>
+                    <p:cond evt="onStopAudio" delay="0">
+                      <p:tgtEl>
+                        <p:sldTgt/>
+                      </p:tgtEl>
+                    </p:cond>
+                  </p:endCondLst>
+                </p:cTn>
+                <p:tgtEl>
+                  <p:spTgt spid="3"/>
+                </p:tgtEl>
+              </p:cMediaNode>
+            </p:audio>
+          </p:childTnLst>
+        </p:cTn>
+      </p:par>
+    </p:tnLst>
+  </p:timing>
 </p:sld>
 </file>
 

</xml_diff>